<commit_message>
add Azure bicep scripts. Deploys OK on Azure
</commit_message>
<xml_diff>
--- a/_documentation/FactoViaWeb.Tech.documentation.pptx
+++ b/_documentation/FactoViaWeb.Tech.documentation.pptx
@@ -5,13 +5,14 @@
     <p:sldMasterId id="2147483648" r:id="rId1"/>
   </p:sldMasterIdLst>
   <p:notesMasterIdLst>
-    <p:notesMasterId r:id="rId6"/>
+    <p:notesMasterId r:id="rId7"/>
   </p:notesMasterIdLst>
   <p:sldIdLst>
     <p:sldId id="256" r:id="rId2"/>
     <p:sldId id="257" r:id="rId3"/>
     <p:sldId id="259" r:id="rId4"/>
-    <p:sldId id="258" r:id="rId5"/>
+    <p:sldId id="260" r:id="rId5"/>
+    <p:sldId id="258" r:id="rId6"/>
   </p:sldIdLst>
   <p:sldSz cx="12192000" cy="6858000"/>
   <p:notesSz cx="6858000" cy="9144000"/>
@@ -110,6 +111,11 @@
       </a:defRPr>
     </a:lvl9pPr>
   </p:defaultTextStyle>
+  <p:extLst>
+    <p:ext uri="{EFAFB233-063F-42B5-8137-9DF3F51BA10A}">
+      <p15:sldGuideLst xmlns:p15="http://schemas.microsoft.com/office/powerpoint/2012/main"/>
+    </p:ext>
+  </p:extLst>
 </p:presentation>
 </file>
 
@@ -697,6 +703,90 @@
             <a:fld id="{AEE32D85-3185-464F-9107-83E90DEE2133}" type="slidenum">
               <a:rPr lang="fr-FR" smtClean="0"/>
               <a:t>4</a:t>
+            </a:fld>
+            <a:endParaRPr lang="fr-FR"/>
+          </a:p>
+        </p:txBody>
+      </p:sp>
+    </p:spTree>
+    <p:extLst>
+      <p:ext uri="{BB962C8B-B14F-4D97-AF65-F5344CB8AC3E}">
+        <p14:creationId xmlns:p14="http://schemas.microsoft.com/office/powerpoint/2010/main" val="1985044563"/>
+      </p:ext>
+    </p:extLst>
+  </p:cSld>
+  <p:clrMapOvr>
+    <a:masterClrMapping/>
+  </p:clrMapOvr>
+</p:notes>
+</file>
+
+<file path=ppt/notesSlides/notesSlide4.xml><?xml version="1.0" encoding="utf-8"?>
+<p:notes xmlns:a="http://schemas.openxmlformats.org/drawingml/2006/main" xmlns:r="http://schemas.openxmlformats.org/officeDocument/2006/relationships" xmlns:p="http://schemas.openxmlformats.org/presentationml/2006/main">
+  <p:cSld>
+    <p:spTree>
+      <p:nvGrpSpPr>
+        <p:cNvPr id="1" name=""/>
+        <p:cNvGrpSpPr/>
+        <p:nvPr/>
+      </p:nvGrpSpPr>
+      <p:grpSpPr>
+        <a:xfrm>
+          <a:off x="0" y="0"/>
+          <a:ext cx="0" cy="0"/>
+          <a:chOff x="0" y="0"/>
+          <a:chExt cx="0" cy="0"/>
+        </a:xfrm>
+      </p:grpSpPr>
+      <p:sp>
+        <p:nvSpPr>
+          <p:cNvPr id="2" name="Slide Image Placeholder 1"/>
+          <p:cNvSpPr>
+            <a:spLocks noGrp="1" noRot="1" noChangeAspect="1"/>
+          </p:cNvSpPr>
+          <p:nvPr>
+            <p:ph type="sldImg"/>
+          </p:nvPr>
+        </p:nvSpPr>
+        <p:spPr/>
+      </p:sp>
+      <p:sp>
+        <p:nvSpPr>
+          <p:cNvPr id="3" name="Notes Placeholder 2"/>
+          <p:cNvSpPr>
+            <a:spLocks noGrp="1"/>
+          </p:cNvSpPr>
+          <p:nvPr>
+            <p:ph type="body" idx="1"/>
+          </p:nvPr>
+        </p:nvSpPr>
+        <p:spPr/>
+        <p:txBody>
+          <a:bodyPr/>
+          <a:lstStyle/>
+          <a:p>
+            <a:endParaRPr lang="fr-FR" dirty="0"/>
+          </a:p>
+        </p:txBody>
+      </p:sp>
+      <p:sp>
+        <p:nvSpPr>
+          <p:cNvPr id="4" name="Slide Number Placeholder 3"/>
+          <p:cNvSpPr>
+            <a:spLocks noGrp="1"/>
+          </p:cNvSpPr>
+          <p:nvPr>
+            <p:ph type="sldNum" sz="quarter" idx="5"/>
+          </p:nvPr>
+        </p:nvSpPr>
+        <p:spPr/>
+        <p:txBody>
+          <a:bodyPr/>
+          <a:lstStyle/>
+          <a:p>
+            <a:fld id="{AEE32D85-3185-464F-9107-83E90DEE2133}" type="slidenum">
+              <a:rPr lang="fr-FR" smtClean="0"/>
+              <a:t>5</a:t>
             </a:fld>
             <a:endParaRPr lang="fr-FR"/>
           </a:p>
@@ -4101,10 +4191,15 @@
             <p:ph idx="1"/>
           </p:nvPr>
         </p:nvSpPr>
-        <p:spPr/>
+        <p:spPr>
+          <a:xfrm>
+            <a:off x="838200" y="1825625"/>
+            <a:ext cx="5430625" cy="4351338"/>
+          </a:xfrm>
+        </p:spPr>
         <p:txBody>
           <a:bodyPr>
-            <a:normAutofit/>
+            <a:normAutofit fontScale="85000" lnSpcReduction="20000"/>
           </a:bodyPr>
           <a:lstStyle/>
           <a:p>
@@ -4121,6 +4216,206 @@
             <a:r>
               <a:rPr lang="fr-FR" sz="2000" dirty="0"/>
               <a:t>, AAD FACTOVIA</a:t>
+            </a:r>
+          </a:p>
+          <a:p>
+            <a:pPr lvl="1"/>
+            <a:r>
+              <a:rPr lang="fr-FR" sz="1600" dirty="0" err="1"/>
+              <a:t>Subscription</a:t>
+            </a:r>
+            <a:r>
+              <a:rPr lang="fr-FR" sz="1600" dirty="0"/>
+              <a:t> : f5d34933-7b5f-40ed-b742-a7722c7b63c5 </a:t>
+            </a:r>
+          </a:p>
+          <a:p>
+            <a:pPr marL="914400" lvl="2" indent="0">
+              <a:buNone/>
+            </a:pPr>
+            <a:r>
+              <a:rPr lang="fr-FR" sz="1200" dirty="0"/>
+              <a:t>{</a:t>
+            </a:r>
+          </a:p>
+          <a:p>
+            <a:pPr marL="914400" lvl="2" indent="0">
+              <a:buNone/>
+            </a:pPr>
+            <a:r>
+              <a:rPr lang="fr-FR" sz="1200" dirty="0"/>
+              <a:t>    "</a:t>
+            </a:r>
+            <a:r>
+              <a:rPr lang="fr-FR" sz="1200" dirty="0" err="1"/>
+              <a:t>cloudName</a:t>
+            </a:r>
+            <a:r>
+              <a:rPr lang="fr-FR" sz="1200" dirty="0"/>
+              <a:t>": "</a:t>
+            </a:r>
+            <a:r>
+              <a:rPr lang="fr-FR" sz="1200" dirty="0" err="1"/>
+              <a:t>AzureCloud</a:t>
+            </a:r>
+            <a:r>
+              <a:rPr lang="fr-FR" sz="1200" dirty="0"/>
+              <a:t>",</a:t>
+            </a:r>
+          </a:p>
+          <a:p>
+            <a:pPr marL="914400" lvl="2" indent="0">
+              <a:buNone/>
+            </a:pPr>
+            <a:r>
+              <a:rPr lang="fr-FR" sz="1200" dirty="0"/>
+              <a:t>    "</a:t>
+            </a:r>
+            <a:r>
+              <a:rPr lang="fr-FR" sz="1200" dirty="0" err="1"/>
+              <a:t>homeTenantId</a:t>
+            </a:r>
+            <a:r>
+              <a:rPr lang="fr-FR" sz="1200" dirty="0"/>
+              <a:t>": "5df2679a-8a5e-46b1-956f-812635d0bfcc",</a:t>
+            </a:r>
+          </a:p>
+          <a:p>
+            <a:pPr marL="914400" lvl="2" indent="0">
+              <a:buNone/>
+            </a:pPr>
+            <a:r>
+              <a:rPr lang="fr-FR" sz="1200" dirty="0"/>
+              <a:t>    "id": "f5d34933-7b5f-40ed-b742-a7722c7b63c5",</a:t>
+            </a:r>
+          </a:p>
+          <a:p>
+            <a:pPr marL="914400" lvl="2" indent="0">
+              <a:buNone/>
+            </a:pPr>
+            <a:r>
+              <a:rPr lang="fr-FR" sz="1200" dirty="0"/>
+              <a:t>    "</a:t>
+            </a:r>
+            <a:r>
+              <a:rPr lang="fr-FR" sz="1200" dirty="0" err="1"/>
+              <a:t>isDefault</a:t>
+            </a:r>
+            <a:r>
+              <a:rPr lang="fr-FR" sz="1200" dirty="0"/>
+              <a:t>": false,</a:t>
+            </a:r>
+          </a:p>
+          <a:p>
+            <a:pPr marL="914400" lvl="2" indent="0">
+              <a:buNone/>
+            </a:pPr>
+            <a:r>
+              <a:rPr lang="fr-FR" sz="1200" dirty="0"/>
+              <a:t>    "</a:t>
+            </a:r>
+            <a:r>
+              <a:rPr lang="fr-FR" sz="1200" dirty="0" err="1"/>
+              <a:t>managedByTenants</a:t>
+            </a:r>
+            <a:r>
+              <a:rPr lang="fr-FR" sz="1200" dirty="0"/>
+              <a:t>": [],</a:t>
+            </a:r>
+          </a:p>
+          <a:p>
+            <a:pPr marL="914400" lvl="2" indent="0">
+              <a:buNone/>
+            </a:pPr>
+            <a:r>
+              <a:rPr lang="fr-FR" sz="1200" dirty="0"/>
+              <a:t>    "</a:t>
+            </a:r>
+            <a:r>
+              <a:rPr lang="fr-FR" sz="1200" dirty="0" err="1"/>
+              <a:t>name</a:t>
+            </a:r>
+            <a:r>
+              <a:rPr lang="fr-FR" sz="1200" dirty="0"/>
+              <a:t>": "MVP-VTH-12k-2021-07-01",</a:t>
+            </a:r>
+          </a:p>
+          <a:p>
+            <a:pPr marL="914400" lvl="2" indent="0">
+              <a:buNone/>
+            </a:pPr>
+            <a:r>
+              <a:rPr lang="fr-FR" sz="1200" dirty="0"/>
+              <a:t>    "state": "</a:t>
+            </a:r>
+            <a:r>
+              <a:rPr lang="fr-FR" sz="1200" dirty="0" err="1"/>
+              <a:t>Enabled</a:t>
+            </a:r>
+            <a:r>
+              <a:rPr lang="fr-FR" sz="1200" dirty="0"/>
+              <a:t>",</a:t>
+            </a:r>
+          </a:p>
+          <a:p>
+            <a:pPr marL="914400" lvl="2" indent="0">
+              <a:buNone/>
+            </a:pPr>
+            <a:r>
+              <a:rPr lang="fr-FR" sz="1200" dirty="0"/>
+              <a:t>    "</a:t>
+            </a:r>
+            <a:r>
+              <a:rPr lang="fr-FR" sz="1200" dirty="0" err="1"/>
+              <a:t>tenantId</a:t>
+            </a:r>
+            <a:r>
+              <a:rPr lang="fr-FR" sz="1200" dirty="0"/>
+              <a:t>": "5df2679a-8a5e-46b1-956f-812635d0bfcc",</a:t>
+            </a:r>
+          </a:p>
+          <a:p>
+            <a:pPr marL="914400" lvl="2" indent="0">
+              <a:buNone/>
+            </a:pPr>
+            <a:r>
+              <a:rPr lang="fr-FR" sz="1200" dirty="0"/>
+              <a:t>    "user": {</a:t>
+            </a:r>
+          </a:p>
+          <a:p>
+            <a:pPr marL="914400" lvl="2" indent="0">
+              <a:buNone/>
+            </a:pPr>
+            <a:r>
+              <a:rPr lang="fr-FR" sz="1200" dirty="0"/>
+              <a:t>      "</a:t>
+            </a:r>
+            <a:r>
+              <a:rPr lang="fr-FR" sz="1200" dirty="0" err="1"/>
+              <a:t>name</a:t>
+            </a:r>
+            <a:r>
+              <a:rPr lang="fr-FR" sz="1200" dirty="0"/>
+              <a:t>": "vthavo@factovia.fr",</a:t>
+            </a:r>
+          </a:p>
+          <a:p>
+            <a:pPr marL="914400" lvl="2" indent="0">
+              <a:buNone/>
+            </a:pPr>
+            <a:r>
+              <a:rPr lang="fr-FR" sz="1200" dirty="0"/>
+              <a:t>      "type": "user"</a:t>
+            </a:r>
+          </a:p>
+          <a:p>
+            <a:pPr marL="914400" lvl="2" indent="0">
+              <a:buNone/>
+            </a:pPr>
+            <a:r>
+              <a:rPr lang="fr-FR" sz="1200" dirty="0"/>
+              <a:t>    }</a:t>
             </a:r>
           </a:p>
           <a:p>
@@ -4349,6 +4644,667 @@
 </file>
 
 <file path=ppt/slides/slide4.xml><?xml version="1.0" encoding="utf-8"?>
+<p:sld xmlns:a="http://schemas.openxmlformats.org/drawingml/2006/main" xmlns:r="http://schemas.openxmlformats.org/officeDocument/2006/relationships" xmlns:p="http://schemas.openxmlformats.org/presentationml/2006/main">
+  <p:cSld>
+    <p:spTree>
+      <p:nvGrpSpPr>
+        <p:cNvPr id="1" name=""/>
+        <p:cNvGrpSpPr/>
+        <p:nvPr/>
+      </p:nvGrpSpPr>
+      <p:grpSpPr>
+        <a:xfrm>
+          <a:off x="0" y="0"/>
+          <a:ext cx="0" cy="0"/>
+          <a:chOff x="0" y="0"/>
+          <a:chExt cx="0" cy="0"/>
+        </a:xfrm>
+      </p:grpSpPr>
+      <p:sp>
+        <p:nvSpPr>
+          <p:cNvPr id="3" name="Title 2">
+            <a:extLst>
+              <a:ext uri="{FF2B5EF4-FFF2-40B4-BE49-F238E27FC236}">
+                <a16:creationId xmlns:a16="http://schemas.microsoft.com/office/drawing/2014/main" id="{EBA0FDD7-EE81-DE1E-DE4C-AFD67FECCAD2}"/>
+              </a:ext>
+            </a:extLst>
+          </p:cNvPr>
+          <p:cNvSpPr>
+            <a:spLocks noGrp="1"/>
+          </p:cNvSpPr>
+          <p:nvPr>
+            <p:ph type="title"/>
+          </p:nvPr>
+        </p:nvSpPr>
+        <p:spPr/>
+        <p:txBody>
+          <a:bodyPr>
+            <a:normAutofit/>
+          </a:bodyPr>
+          <a:lstStyle/>
+          <a:p>
+            <a:r>
+              <a:rPr lang="fr-FR" dirty="0" err="1"/>
+              <a:t>Deploy</a:t>
+            </a:r>
+            <a:r>
+              <a:rPr lang="fr-FR" dirty="0"/>
+              <a:t> </a:t>
+            </a:r>
+            <a:r>
+              <a:rPr lang="fr-FR" dirty="0" err="1"/>
+              <a:t>with</a:t>
+            </a:r>
+            <a:r>
+              <a:rPr lang="fr-FR" dirty="0"/>
+              <a:t> Azure </a:t>
+            </a:r>
+            <a:r>
+              <a:rPr lang="fr-FR" dirty="0" err="1"/>
+              <a:t>Bicep</a:t>
+            </a:r>
+            <a:br>
+              <a:rPr lang="fr-FR" sz="2000" dirty="0"/>
+            </a:br>
+            <a:r>
+              <a:rPr lang="fr-FR" sz="1400" dirty="0">
+                <a:hlinkClick r:id="rId3"/>
+              </a:rPr>
+              <a:t>https://marketplace.visualstudio.com/items?itemName=ms-azuretools.vscode-bicep</a:t>
+            </a:r>
+            <a:r>
+              <a:rPr lang="fr-FR" sz="1400" dirty="0"/>
+              <a:t> </a:t>
+            </a:r>
+            <a:endParaRPr lang="fr-FR" sz="3200" dirty="0"/>
+          </a:p>
+        </p:txBody>
+      </p:sp>
+      <p:pic>
+        <p:nvPicPr>
+          <p:cNvPr id="9" name="Picture 8">
+            <a:extLst>
+              <a:ext uri="{FF2B5EF4-FFF2-40B4-BE49-F238E27FC236}">
+                <a16:creationId xmlns:a16="http://schemas.microsoft.com/office/drawing/2014/main" id="{9C03F949-5FC0-6E60-652A-3920B5A08974}"/>
+              </a:ext>
+            </a:extLst>
+          </p:cNvPr>
+          <p:cNvPicPr>
+            <a:picLocks noChangeAspect="1"/>
+          </p:cNvPicPr>
+          <p:nvPr/>
+        </p:nvPicPr>
+        <p:blipFill>
+          <a:blip r:embed="rId4"/>
+          <a:stretch>
+            <a:fillRect/>
+          </a:stretch>
+        </p:blipFill>
+        <p:spPr>
+          <a:xfrm>
+            <a:off x="103909" y="1482969"/>
+            <a:ext cx="10515600" cy="3892061"/>
+          </a:xfrm>
+          <a:prstGeom prst="rect">
+            <a:avLst/>
+          </a:prstGeom>
+        </p:spPr>
+      </p:pic>
+      <p:pic>
+        <p:nvPicPr>
+          <p:cNvPr id="12" name="Picture 11">
+            <a:extLst>
+              <a:ext uri="{FF2B5EF4-FFF2-40B4-BE49-F238E27FC236}">
+                <a16:creationId xmlns:a16="http://schemas.microsoft.com/office/drawing/2014/main" id="{01FFF026-C1B8-2C90-01BE-4E63BE4B78CB}"/>
+              </a:ext>
+            </a:extLst>
+          </p:cNvPr>
+          <p:cNvPicPr>
+            <a:picLocks noChangeAspect="1"/>
+          </p:cNvPicPr>
+          <p:nvPr/>
+        </p:nvPicPr>
+        <p:blipFill rotWithShape="1">
+          <a:blip r:embed="rId5"/>
+          <a:srcRect r="17276"/>
+          <a:stretch/>
+        </p:blipFill>
+        <p:spPr>
+          <a:xfrm>
+            <a:off x="7319948" y="63755"/>
+            <a:ext cx="4567251" cy="2703491"/>
+          </a:xfrm>
+          <a:prstGeom prst="rect">
+            <a:avLst/>
+          </a:prstGeom>
+          <a:solidFill>
+            <a:srgbClr val="FFFFFF">
+              <a:shade val="85000"/>
+            </a:srgbClr>
+          </a:solidFill>
+          <a:ln w="190500" cap="rnd">
+            <a:solidFill>
+              <a:srgbClr val="FFFFFF"/>
+            </a:solidFill>
+          </a:ln>
+          <a:effectLst>
+            <a:outerShdw blurRad="50000" algn="tl" rotWithShape="0">
+              <a:srgbClr val="000000">
+                <a:alpha val="41000"/>
+              </a:srgbClr>
+            </a:outerShdw>
+          </a:effectLst>
+          <a:scene3d>
+            <a:camera prst="orthographicFront"/>
+            <a:lightRig rig="twoPt" dir="t">
+              <a:rot lat="0" lon="0" rev="7800000"/>
+            </a:lightRig>
+          </a:scene3d>
+          <a:sp3d contourW="6350">
+            <a:bevelT w="50800" h="16510"/>
+            <a:contourClr>
+              <a:srgbClr val="C0C0C0"/>
+            </a:contourClr>
+          </a:sp3d>
+        </p:spPr>
+      </p:pic>
+      <p:pic>
+        <p:nvPicPr>
+          <p:cNvPr id="14" name="Picture 13">
+            <a:extLst>
+              <a:ext uri="{FF2B5EF4-FFF2-40B4-BE49-F238E27FC236}">
+                <a16:creationId xmlns:a16="http://schemas.microsoft.com/office/drawing/2014/main" id="{32D92681-1B4B-519D-CE72-FBCD3B6FA1DD}"/>
+              </a:ext>
+            </a:extLst>
+          </p:cNvPr>
+          <p:cNvPicPr>
+            <a:picLocks noChangeAspect="1"/>
+          </p:cNvPicPr>
+          <p:nvPr/>
+        </p:nvPicPr>
+        <p:blipFill>
+          <a:blip r:embed="rId6"/>
+          <a:stretch>
+            <a:fillRect/>
+          </a:stretch>
+        </p:blipFill>
+        <p:spPr>
+          <a:xfrm>
+            <a:off x="263250" y="5171638"/>
+            <a:ext cx="8900446" cy="1485036"/>
+          </a:xfrm>
+          <a:prstGeom prst="rect">
+            <a:avLst/>
+          </a:prstGeom>
+          <a:solidFill>
+            <a:srgbClr val="FFFFFF">
+              <a:shade val="85000"/>
+            </a:srgbClr>
+          </a:solidFill>
+          <a:ln w="190500" cap="rnd">
+            <a:solidFill>
+              <a:srgbClr val="FFFFFF"/>
+            </a:solidFill>
+          </a:ln>
+          <a:effectLst>
+            <a:outerShdw blurRad="50000" algn="tl" rotWithShape="0">
+              <a:srgbClr val="000000">
+                <a:alpha val="41000"/>
+              </a:srgbClr>
+            </a:outerShdw>
+          </a:effectLst>
+          <a:scene3d>
+            <a:camera prst="orthographicFront"/>
+            <a:lightRig rig="twoPt" dir="t">
+              <a:rot lat="0" lon="0" rev="7800000"/>
+            </a:lightRig>
+          </a:scene3d>
+          <a:sp3d contourW="6350">
+            <a:bevelT w="50800" h="16510"/>
+            <a:contourClr>
+              <a:srgbClr val="C0C0C0"/>
+            </a:contourClr>
+          </a:sp3d>
+        </p:spPr>
+      </p:pic>
+      <p:sp>
+        <p:nvSpPr>
+          <p:cNvPr id="17" name="Content Placeholder 3">
+            <a:extLst>
+              <a:ext uri="{FF2B5EF4-FFF2-40B4-BE49-F238E27FC236}">
+                <a16:creationId xmlns:a16="http://schemas.microsoft.com/office/drawing/2014/main" id="{207640DA-BCB7-5A41-E790-08DB03CFD89E}"/>
+              </a:ext>
+            </a:extLst>
+          </p:cNvPr>
+          <p:cNvSpPr txBox="1">
+            <a:spLocks/>
+          </p:cNvSpPr>
+          <p:nvPr/>
+        </p:nvSpPr>
+        <p:spPr>
+          <a:xfrm>
+            <a:off x="6539696" y="3473471"/>
+            <a:ext cx="5389054" cy="3183203"/>
+          </a:xfrm>
+          <a:prstGeom prst="rect">
+            <a:avLst/>
+          </a:prstGeom>
+          <a:solidFill>
+            <a:schemeClr val="bg2"/>
+          </a:solidFill>
+        </p:spPr>
+        <p:txBody>
+          <a:bodyPr vert="horz" lIns="91440" tIns="45720" rIns="91440" bIns="45720" rtlCol="0">
+            <a:normAutofit/>
+          </a:bodyPr>
+          <a:lstStyle>
+            <a:lvl1pPr marL="228600" indent="-228600" algn="l" defTabSz="914400" rtl="0" eaLnBrk="1" latinLnBrk="0" hangingPunct="1">
+              <a:lnSpc>
+                <a:spcPct val="90000"/>
+              </a:lnSpc>
+              <a:spcBef>
+                <a:spcPts val="1000"/>
+              </a:spcBef>
+              <a:buFont typeface="Arial" panose="020B0604020202020204" pitchFamily="34" charset="0"/>
+              <a:buChar char="•"/>
+              <a:defRPr sz="2800" kern="1200">
+                <a:solidFill>
+                  <a:schemeClr val="tx1"/>
+                </a:solidFill>
+                <a:latin typeface="+mn-lt"/>
+                <a:ea typeface="+mn-ea"/>
+                <a:cs typeface="+mn-cs"/>
+              </a:defRPr>
+            </a:lvl1pPr>
+            <a:lvl2pPr marL="685800" indent="-228600" algn="l" defTabSz="914400" rtl="0" eaLnBrk="1" latinLnBrk="0" hangingPunct="1">
+              <a:lnSpc>
+                <a:spcPct val="90000"/>
+              </a:lnSpc>
+              <a:spcBef>
+                <a:spcPts val="500"/>
+              </a:spcBef>
+              <a:buFont typeface="Arial" panose="020B0604020202020204" pitchFamily="34" charset="0"/>
+              <a:buChar char="•"/>
+              <a:defRPr sz="2400" kern="1200">
+                <a:solidFill>
+                  <a:schemeClr val="tx1"/>
+                </a:solidFill>
+                <a:latin typeface="+mn-lt"/>
+                <a:ea typeface="+mn-ea"/>
+                <a:cs typeface="+mn-cs"/>
+              </a:defRPr>
+            </a:lvl2pPr>
+            <a:lvl3pPr marL="1143000" indent="-228600" algn="l" defTabSz="914400" rtl="0" eaLnBrk="1" latinLnBrk="0" hangingPunct="1">
+              <a:lnSpc>
+                <a:spcPct val="90000"/>
+              </a:lnSpc>
+              <a:spcBef>
+                <a:spcPts val="500"/>
+              </a:spcBef>
+              <a:buFont typeface="Arial" panose="020B0604020202020204" pitchFamily="34" charset="0"/>
+              <a:buChar char="•"/>
+              <a:defRPr sz="2000" kern="1200">
+                <a:solidFill>
+                  <a:schemeClr val="tx1"/>
+                </a:solidFill>
+                <a:latin typeface="+mn-lt"/>
+                <a:ea typeface="+mn-ea"/>
+                <a:cs typeface="+mn-cs"/>
+              </a:defRPr>
+            </a:lvl3pPr>
+            <a:lvl4pPr marL="1600200" indent="-228600" algn="l" defTabSz="914400" rtl="0" eaLnBrk="1" latinLnBrk="0" hangingPunct="1">
+              <a:lnSpc>
+                <a:spcPct val="90000"/>
+              </a:lnSpc>
+              <a:spcBef>
+                <a:spcPts val="500"/>
+              </a:spcBef>
+              <a:buFont typeface="Arial" panose="020B0604020202020204" pitchFamily="34" charset="0"/>
+              <a:buChar char="•"/>
+              <a:defRPr sz="1800" kern="1200">
+                <a:solidFill>
+                  <a:schemeClr val="tx1"/>
+                </a:solidFill>
+                <a:latin typeface="+mn-lt"/>
+                <a:ea typeface="+mn-ea"/>
+                <a:cs typeface="+mn-cs"/>
+              </a:defRPr>
+            </a:lvl4pPr>
+            <a:lvl5pPr marL="2057400" indent="-228600" algn="l" defTabSz="914400" rtl="0" eaLnBrk="1" latinLnBrk="0" hangingPunct="1">
+              <a:lnSpc>
+                <a:spcPct val="90000"/>
+              </a:lnSpc>
+              <a:spcBef>
+                <a:spcPts val="500"/>
+              </a:spcBef>
+              <a:buFont typeface="Arial" panose="020B0604020202020204" pitchFamily="34" charset="0"/>
+              <a:buChar char="•"/>
+              <a:defRPr sz="1800" kern="1200">
+                <a:solidFill>
+                  <a:schemeClr val="tx1"/>
+                </a:solidFill>
+                <a:latin typeface="+mn-lt"/>
+                <a:ea typeface="+mn-ea"/>
+                <a:cs typeface="+mn-cs"/>
+              </a:defRPr>
+            </a:lvl5pPr>
+            <a:lvl6pPr marL="2514600" indent="-228600" algn="l" defTabSz="914400" rtl="0" eaLnBrk="1" latinLnBrk="0" hangingPunct="1">
+              <a:lnSpc>
+                <a:spcPct val="90000"/>
+              </a:lnSpc>
+              <a:spcBef>
+                <a:spcPts val="500"/>
+              </a:spcBef>
+              <a:buFont typeface="Arial" panose="020B0604020202020204" pitchFamily="34" charset="0"/>
+              <a:buChar char="•"/>
+              <a:defRPr sz="1800" kern="1200">
+                <a:solidFill>
+                  <a:schemeClr val="tx1"/>
+                </a:solidFill>
+                <a:latin typeface="+mn-lt"/>
+                <a:ea typeface="+mn-ea"/>
+                <a:cs typeface="+mn-cs"/>
+              </a:defRPr>
+            </a:lvl6pPr>
+            <a:lvl7pPr marL="2971800" indent="-228600" algn="l" defTabSz="914400" rtl="0" eaLnBrk="1" latinLnBrk="0" hangingPunct="1">
+              <a:lnSpc>
+                <a:spcPct val="90000"/>
+              </a:lnSpc>
+              <a:spcBef>
+                <a:spcPts val="500"/>
+              </a:spcBef>
+              <a:buFont typeface="Arial" panose="020B0604020202020204" pitchFamily="34" charset="0"/>
+              <a:buChar char="•"/>
+              <a:defRPr sz="1800" kern="1200">
+                <a:solidFill>
+                  <a:schemeClr val="tx1"/>
+                </a:solidFill>
+                <a:latin typeface="+mn-lt"/>
+                <a:ea typeface="+mn-ea"/>
+                <a:cs typeface="+mn-cs"/>
+              </a:defRPr>
+            </a:lvl7pPr>
+            <a:lvl8pPr marL="3429000" indent="-228600" algn="l" defTabSz="914400" rtl="0" eaLnBrk="1" latinLnBrk="0" hangingPunct="1">
+              <a:lnSpc>
+                <a:spcPct val="90000"/>
+              </a:lnSpc>
+              <a:spcBef>
+                <a:spcPts val="500"/>
+              </a:spcBef>
+              <a:buFont typeface="Arial" panose="020B0604020202020204" pitchFamily="34" charset="0"/>
+              <a:buChar char="•"/>
+              <a:defRPr sz="1800" kern="1200">
+                <a:solidFill>
+                  <a:schemeClr val="tx1"/>
+                </a:solidFill>
+                <a:latin typeface="+mn-lt"/>
+                <a:ea typeface="+mn-ea"/>
+                <a:cs typeface="+mn-cs"/>
+              </a:defRPr>
+            </a:lvl8pPr>
+            <a:lvl9pPr marL="3886200" indent="-228600" algn="l" defTabSz="914400" rtl="0" eaLnBrk="1" latinLnBrk="0" hangingPunct="1">
+              <a:lnSpc>
+                <a:spcPct val="90000"/>
+              </a:lnSpc>
+              <a:spcBef>
+                <a:spcPts val="500"/>
+              </a:spcBef>
+              <a:buFont typeface="Arial" panose="020B0604020202020204" pitchFamily="34" charset="0"/>
+              <a:buChar char="•"/>
+              <a:defRPr sz="1800" kern="1200">
+                <a:solidFill>
+                  <a:schemeClr val="tx1"/>
+                </a:solidFill>
+                <a:latin typeface="+mn-lt"/>
+                <a:ea typeface="+mn-ea"/>
+                <a:cs typeface="+mn-cs"/>
+              </a:defRPr>
+            </a:lvl9pPr>
+          </a:lstStyle>
+          <a:p>
+            <a:pPr marL="0" indent="0">
+              <a:buNone/>
+            </a:pPr>
+            <a:r>
+              <a:rPr lang="fr-FR" sz="900" dirty="0">
+                <a:latin typeface="Consolas" panose="020B0609020204030204" pitchFamily="49" charset="0"/>
+              </a:rPr>
+              <a:t>1:47:25 AM: </a:t>
+            </a:r>
+            <a:r>
+              <a:rPr lang="fr-FR" sz="900" dirty="0" err="1">
+                <a:latin typeface="Consolas" panose="020B0609020204030204" pitchFamily="49" charset="0"/>
+              </a:rPr>
+              <a:t>Starting</a:t>
+            </a:r>
+            <a:r>
+              <a:rPr lang="fr-FR" sz="900" dirty="0">
+                <a:latin typeface="Consolas" panose="020B0609020204030204" pitchFamily="49" charset="0"/>
+              </a:rPr>
+              <a:t> </a:t>
+            </a:r>
+            <a:r>
+              <a:rPr lang="fr-FR" sz="900" dirty="0" err="1">
+                <a:latin typeface="Consolas" panose="020B0609020204030204" pitchFamily="49" charset="0"/>
+              </a:rPr>
+              <a:t>deployment</a:t>
+            </a:r>
+            <a:r>
+              <a:rPr lang="fr-FR" sz="900" dirty="0">
+                <a:latin typeface="Consolas" panose="020B0609020204030204" pitchFamily="49" charset="0"/>
+              </a:rPr>
+              <a:t> of c:\Users\vincent.thavonekham\source\repos\Web.FactoVia.Tech\_ARMTemplate\swa-small.bicep</a:t>
+            </a:r>
+          </a:p>
+          <a:p>
+            <a:pPr marL="0" indent="0">
+              <a:buNone/>
+            </a:pPr>
+            <a:r>
+              <a:rPr lang="fr-FR" sz="900" dirty="0">
+                <a:latin typeface="Consolas" panose="020B0609020204030204" pitchFamily="49" charset="0"/>
+              </a:rPr>
+              <a:t>1:47:25 AM: Scope </a:t>
+            </a:r>
+            <a:r>
+              <a:rPr lang="fr-FR" sz="900" dirty="0" err="1">
+                <a:latin typeface="Consolas" panose="020B0609020204030204" pitchFamily="49" charset="0"/>
+              </a:rPr>
+              <a:t>specified</a:t>
+            </a:r>
+            <a:r>
+              <a:rPr lang="fr-FR" sz="900" dirty="0">
+                <a:latin typeface="Consolas" panose="020B0609020204030204" pitchFamily="49" charset="0"/>
+              </a:rPr>
+              <a:t> in </a:t>
+            </a:r>
+            <a:r>
+              <a:rPr lang="fr-FR" sz="900" dirty="0" err="1">
+                <a:latin typeface="Consolas" panose="020B0609020204030204" pitchFamily="49" charset="0"/>
+              </a:rPr>
+              <a:t>swa-small.bicep</a:t>
+            </a:r>
+            <a:r>
+              <a:rPr lang="fr-FR" sz="900" dirty="0">
+                <a:latin typeface="Consolas" panose="020B0609020204030204" pitchFamily="49" charset="0"/>
+              </a:rPr>
+              <a:t> -&gt; </a:t>
+            </a:r>
+            <a:r>
+              <a:rPr lang="fr-FR" sz="900" dirty="0" err="1">
+                <a:latin typeface="Consolas" panose="020B0609020204030204" pitchFamily="49" charset="0"/>
+              </a:rPr>
+              <a:t>resourceGroup</a:t>
+            </a:r>
+            <a:endParaRPr lang="fr-FR" sz="900" dirty="0">
+              <a:latin typeface="Consolas" panose="020B0609020204030204" pitchFamily="49" charset="0"/>
+            </a:endParaRPr>
+          </a:p>
+          <a:p>
+            <a:pPr marL="0" indent="0">
+              <a:buNone/>
+            </a:pPr>
+            <a:r>
+              <a:rPr lang="fr-FR" sz="900" dirty="0">
+                <a:latin typeface="Consolas" panose="020B0609020204030204" pitchFamily="49" charset="0"/>
+              </a:rPr>
+              <a:t>1:47:28 AM: No </a:t>
+            </a:r>
+            <a:r>
+              <a:rPr lang="fr-FR" sz="900" dirty="0" err="1">
+                <a:latin typeface="Consolas" panose="020B0609020204030204" pitchFamily="49" charset="0"/>
+              </a:rPr>
+              <a:t>parameter</a:t>
+            </a:r>
+            <a:r>
+              <a:rPr lang="fr-FR" sz="900" dirty="0">
+                <a:latin typeface="Consolas" panose="020B0609020204030204" pitchFamily="49" charset="0"/>
+              </a:rPr>
+              <a:t> file </a:t>
+            </a:r>
+            <a:r>
+              <a:rPr lang="fr-FR" sz="900" dirty="0" err="1">
+                <a:latin typeface="Consolas" panose="020B0609020204030204" pitchFamily="49" charset="0"/>
+              </a:rPr>
+              <a:t>was</a:t>
+            </a:r>
+            <a:r>
+              <a:rPr lang="fr-FR" sz="900" dirty="0">
+                <a:latin typeface="Consolas" panose="020B0609020204030204" pitchFamily="49" charset="0"/>
+              </a:rPr>
+              <a:t> </a:t>
+            </a:r>
+            <a:r>
+              <a:rPr lang="fr-FR" sz="900" dirty="0" err="1">
+                <a:latin typeface="Consolas" panose="020B0609020204030204" pitchFamily="49" charset="0"/>
+              </a:rPr>
+              <a:t>provided</a:t>
+            </a:r>
+            <a:endParaRPr lang="fr-FR" sz="900" dirty="0">
+              <a:latin typeface="Consolas" panose="020B0609020204030204" pitchFamily="49" charset="0"/>
+            </a:endParaRPr>
+          </a:p>
+          <a:p>
+            <a:pPr marL="0" indent="0">
+              <a:buNone/>
+            </a:pPr>
+            <a:r>
+              <a:rPr lang="fr-FR" sz="900" dirty="0">
+                <a:latin typeface="Consolas" panose="020B0609020204030204" pitchFamily="49" charset="0"/>
+              </a:rPr>
+              <a:t>1:47:45 AM: </a:t>
+            </a:r>
+            <a:r>
+              <a:rPr lang="fr-FR" sz="900" dirty="0" err="1">
+                <a:latin typeface="Consolas" panose="020B0609020204030204" pitchFamily="49" charset="0"/>
+              </a:rPr>
+              <a:t>Deployment</a:t>
+            </a:r>
+            <a:r>
+              <a:rPr lang="fr-FR" sz="900" dirty="0">
+                <a:latin typeface="Consolas" panose="020B0609020204030204" pitchFamily="49" charset="0"/>
+              </a:rPr>
+              <a:t> </a:t>
+            </a:r>
+            <a:r>
+              <a:rPr lang="fr-FR" sz="900" dirty="0" err="1">
+                <a:latin typeface="Consolas" panose="020B0609020204030204" pitchFamily="49" charset="0"/>
+              </a:rPr>
+              <a:t>started</a:t>
+            </a:r>
+            <a:r>
+              <a:rPr lang="fr-FR" sz="900" dirty="0">
+                <a:latin typeface="Consolas" panose="020B0609020204030204" pitchFamily="49" charset="0"/>
+              </a:rPr>
+              <a:t> for c:\Users\vincent.thavonekham\source\repos\Web.FactoVia.Tech\_ARMTemplate\swa-small.bicep.</a:t>
+            </a:r>
+          </a:p>
+          <a:p>
+            <a:pPr marL="0" indent="0">
+              <a:buNone/>
+            </a:pPr>
+            <a:r>
+              <a:rPr lang="fr-FR" sz="900" dirty="0">
+                <a:latin typeface="Consolas" panose="020B0609020204030204" pitchFamily="49" charset="0"/>
+              </a:rPr>
+              <a:t>1:47:45 AM: </a:t>
+            </a:r>
+            <a:r>
+              <a:rPr lang="fr-FR" sz="900" dirty="0" err="1">
+                <a:latin typeface="Consolas" panose="020B0609020204030204" pitchFamily="49" charset="0"/>
+              </a:rPr>
+              <a:t>View</a:t>
+            </a:r>
+            <a:r>
+              <a:rPr lang="fr-FR" sz="900" dirty="0">
+                <a:latin typeface="Consolas" panose="020B0609020204030204" pitchFamily="49" charset="0"/>
+              </a:rPr>
+              <a:t> </a:t>
+            </a:r>
+            <a:r>
+              <a:rPr lang="fr-FR" sz="900" dirty="0" err="1">
+                <a:latin typeface="Consolas" panose="020B0609020204030204" pitchFamily="49" charset="0"/>
+              </a:rPr>
+              <a:t>deployment</a:t>
+            </a:r>
+            <a:r>
+              <a:rPr lang="fr-FR" sz="900" dirty="0">
+                <a:latin typeface="Consolas" panose="020B0609020204030204" pitchFamily="49" charset="0"/>
+              </a:rPr>
+              <a:t> in portal: https://portal.azure.com/#blade/HubsExtension/DeploymentDetailsBlade/overview/id/%2Fsubscriptions%2Ff5d34933-7b5f-40ed-b742-a7722c7b63c5%2FresourceGroups%2Frg-factoviaweb-frce-prod-fr%2Fproviders%2FMicrosoft.Resources%2Fdeployments%2Fbicep_deployment_20220716234744.</a:t>
+            </a:r>
+          </a:p>
+          <a:p>
+            <a:pPr marL="0" indent="0">
+              <a:buNone/>
+            </a:pPr>
+            <a:r>
+              <a:rPr lang="fr-FR" sz="900" dirty="0">
+                <a:latin typeface="Consolas" panose="020B0609020204030204" pitchFamily="49" charset="0"/>
+              </a:rPr>
+              <a:t>1:47:48 AM: </a:t>
+            </a:r>
+            <a:r>
+              <a:rPr lang="fr-FR" sz="900" dirty="0" err="1">
+                <a:latin typeface="Consolas" panose="020B0609020204030204" pitchFamily="49" charset="0"/>
+              </a:rPr>
+              <a:t>Deployment</a:t>
+            </a:r>
+            <a:r>
+              <a:rPr lang="fr-FR" sz="900" dirty="0">
+                <a:latin typeface="Consolas" panose="020B0609020204030204" pitchFamily="49" charset="0"/>
+              </a:rPr>
+              <a:t> </a:t>
+            </a:r>
+            <a:r>
+              <a:rPr lang="fr-FR" sz="900" dirty="0" err="1">
+                <a:latin typeface="Consolas" panose="020B0609020204030204" pitchFamily="49" charset="0"/>
+              </a:rPr>
+              <a:t>succeeded</a:t>
+            </a:r>
+            <a:r>
+              <a:rPr lang="fr-FR" sz="900" dirty="0">
+                <a:latin typeface="Consolas" panose="020B0609020204030204" pitchFamily="49" charset="0"/>
+              </a:rPr>
+              <a:t> for c:\Users\vincent.thavonekham\source\repos\Web.FactoVia.Tech\_ARMTemplate\swa-small.bicep.</a:t>
+            </a:r>
+          </a:p>
+        </p:txBody>
+      </p:sp>
+    </p:spTree>
+    <p:extLst>
+      <p:ext uri="{BB962C8B-B14F-4D97-AF65-F5344CB8AC3E}">
+        <p14:creationId xmlns:p14="http://schemas.microsoft.com/office/powerpoint/2010/main" val="4004410580"/>
+      </p:ext>
+    </p:extLst>
+  </p:cSld>
+  <p:clrMapOvr>
+    <a:masterClrMapping/>
+  </p:clrMapOvr>
+</p:sld>
+</file>
+
+<file path=ppt/slides/slide5.xml><?xml version="1.0" encoding="utf-8"?>
 <p:sld xmlns:a="http://schemas.openxmlformats.org/drawingml/2006/main" xmlns:r="http://schemas.openxmlformats.org/officeDocument/2006/relationships" xmlns:p="http://schemas.openxmlformats.org/presentationml/2006/main">
   <p:cSld>
     <p:spTree>

</xml_diff>